<commit_message>
Fixed instructions and default button mapping
</commit_message>
<xml_diff>
--- a/cogni.flanker.task/FlankerInstruction.pptx
+++ b/cogni.flanker.task/FlankerInstruction.pptx
@@ -4,8 +4,12 @@
   <p:sldMasterIdLst>
     <p:sldMasterId id="2147483648" r:id="rId1"/>
   </p:sldMasterIdLst>
+  <p:notesMasterIdLst>
+    <p:notesMasterId r:id="rId4"/>
+  </p:notesMasterIdLst>
   <p:sldIdLst>
     <p:sldId id="277" r:id="rId2"/>
+    <p:sldId id="278" r:id="rId3"/>
   </p:sldIdLst>
   <p:sldSz cx="12192000" cy="6858000"/>
   <p:notesSz cx="6858000" cy="9144000"/>
@@ -110,6 +114,532 @@
     </p:ext>
   </p:extLst>
 </p:presentation>
+</file>
+
+<file path=ppt/notesMasters/notesMaster1.xml><?xml version="1.0" encoding="utf-8"?>
+<p:notesMaster xmlns:a="http://schemas.openxmlformats.org/drawingml/2006/main" xmlns:r="http://schemas.openxmlformats.org/officeDocument/2006/relationships" xmlns:p="http://schemas.openxmlformats.org/presentationml/2006/main">
+  <p:cSld>
+    <p:bg>
+      <p:bgRef idx="1001">
+        <a:schemeClr val="bg1"/>
+      </p:bgRef>
+    </p:bg>
+    <p:spTree>
+      <p:nvGrpSpPr>
+        <p:cNvPr id="1" name=""/>
+        <p:cNvGrpSpPr/>
+        <p:nvPr/>
+      </p:nvGrpSpPr>
+      <p:grpSpPr>
+        <a:xfrm>
+          <a:off x="0" y="0"/>
+          <a:ext cx="0" cy="0"/>
+          <a:chOff x="0" y="0"/>
+          <a:chExt cx="0" cy="0"/>
+        </a:xfrm>
+      </p:grpSpPr>
+      <p:sp>
+        <p:nvSpPr>
+          <p:cNvPr id="2" name="Header Placeholder 1"/>
+          <p:cNvSpPr>
+            <a:spLocks noGrp="1"/>
+          </p:cNvSpPr>
+          <p:nvPr>
+            <p:ph type="hdr" sz="quarter"/>
+          </p:nvPr>
+        </p:nvSpPr>
+        <p:spPr>
+          <a:xfrm>
+            <a:off x="0" y="0"/>
+            <a:ext cx="2971800" cy="458788"/>
+          </a:xfrm>
+          <a:prstGeom prst="rect">
+            <a:avLst/>
+          </a:prstGeom>
+        </p:spPr>
+        <p:txBody>
+          <a:bodyPr vert="horz" lIns="91440" tIns="45720" rIns="91440" bIns="45720" rtlCol="0"/>
+          <a:lstStyle>
+            <a:lvl1pPr algn="l">
+              <a:defRPr sz="1200"/>
+            </a:lvl1pPr>
+          </a:lstStyle>
+          <a:p>
+            <a:endParaRPr lang="en-DK"/>
+          </a:p>
+        </p:txBody>
+      </p:sp>
+      <p:sp>
+        <p:nvSpPr>
+          <p:cNvPr id="3" name="Date Placeholder 2"/>
+          <p:cNvSpPr>
+            <a:spLocks noGrp="1"/>
+          </p:cNvSpPr>
+          <p:nvPr>
+            <p:ph type="dt" idx="1"/>
+          </p:nvPr>
+        </p:nvSpPr>
+        <p:spPr>
+          <a:xfrm>
+            <a:off x="3884613" y="0"/>
+            <a:ext cx="2971800" cy="458788"/>
+          </a:xfrm>
+          <a:prstGeom prst="rect">
+            <a:avLst/>
+          </a:prstGeom>
+        </p:spPr>
+        <p:txBody>
+          <a:bodyPr vert="horz" lIns="91440" tIns="45720" rIns="91440" bIns="45720" rtlCol="0"/>
+          <a:lstStyle>
+            <a:lvl1pPr algn="r">
+              <a:defRPr sz="1200"/>
+            </a:lvl1pPr>
+          </a:lstStyle>
+          <a:p>
+            <a:fld id="{B44A7E94-C6F7-4703-8E02-3EB3667F98A3}" type="datetimeFigureOut">
+              <a:rPr lang="en-DK" smtClean="0"/>
+              <a:t>19/04/2025</a:t>
+            </a:fld>
+            <a:endParaRPr lang="en-DK"/>
+          </a:p>
+        </p:txBody>
+      </p:sp>
+      <p:sp>
+        <p:nvSpPr>
+          <p:cNvPr id="4" name="Slide Image Placeholder 3"/>
+          <p:cNvSpPr>
+            <a:spLocks noGrp="1" noRot="1" noChangeAspect="1"/>
+          </p:cNvSpPr>
+          <p:nvPr>
+            <p:ph type="sldImg" idx="2"/>
+          </p:nvPr>
+        </p:nvSpPr>
+        <p:spPr>
+          <a:xfrm>
+            <a:off x="685800" y="1143000"/>
+            <a:ext cx="5486400" cy="3086100"/>
+          </a:xfrm>
+          <a:prstGeom prst="rect">
+            <a:avLst/>
+          </a:prstGeom>
+          <a:noFill/>
+          <a:ln w="12700">
+            <a:solidFill>
+              <a:prstClr val="black"/>
+            </a:solidFill>
+          </a:ln>
+        </p:spPr>
+        <p:txBody>
+          <a:bodyPr vert="horz" lIns="91440" tIns="45720" rIns="91440" bIns="45720" rtlCol="0" anchor="ctr"/>
+          <a:lstStyle/>
+          <a:p>
+            <a:endParaRPr lang="en-DK"/>
+          </a:p>
+        </p:txBody>
+      </p:sp>
+      <p:sp>
+        <p:nvSpPr>
+          <p:cNvPr id="5" name="Notes Placeholder 4"/>
+          <p:cNvSpPr>
+            <a:spLocks noGrp="1"/>
+          </p:cNvSpPr>
+          <p:nvPr>
+            <p:ph type="body" sz="quarter" idx="3"/>
+          </p:nvPr>
+        </p:nvSpPr>
+        <p:spPr>
+          <a:xfrm>
+            <a:off x="685800" y="4400550"/>
+            <a:ext cx="5486400" cy="3600450"/>
+          </a:xfrm>
+          <a:prstGeom prst="rect">
+            <a:avLst/>
+          </a:prstGeom>
+        </p:spPr>
+        <p:txBody>
+          <a:bodyPr vert="horz" lIns="91440" tIns="45720" rIns="91440" bIns="45720" rtlCol="0"/>
+          <a:lstStyle/>
+          <a:p>
+            <a:pPr lvl="0"/>
+            <a:r>
+              <a:rPr lang="en-US"/>
+              <a:t>Click to edit Master text styles</a:t>
+            </a:r>
+          </a:p>
+          <a:p>
+            <a:pPr lvl="1"/>
+            <a:r>
+              <a:rPr lang="en-US"/>
+              <a:t>Second level</a:t>
+            </a:r>
+          </a:p>
+          <a:p>
+            <a:pPr lvl="2"/>
+            <a:r>
+              <a:rPr lang="en-US"/>
+              <a:t>Third level</a:t>
+            </a:r>
+          </a:p>
+          <a:p>
+            <a:pPr lvl="3"/>
+            <a:r>
+              <a:rPr lang="en-US"/>
+              <a:t>Fourth level</a:t>
+            </a:r>
+          </a:p>
+          <a:p>
+            <a:pPr lvl="4"/>
+            <a:r>
+              <a:rPr lang="en-US"/>
+              <a:t>Fifth level</a:t>
+            </a:r>
+            <a:endParaRPr lang="en-DK"/>
+          </a:p>
+        </p:txBody>
+      </p:sp>
+      <p:sp>
+        <p:nvSpPr>
+          <p:cNvPr id="6" name="Footer Placeholder 5"/>
+          <p:cNvSpPr>
+            <a:spLocks noGrp="1"/>
+          </p:cNvSpPr>
+          <p:nvPr>
+            <p:ph type="ftr" sz="quarter" idx="4"/>
+          </p:nvPr>
+        </p:nvSpPr>
+        <p:spPr>
+          <a:xfrm>
+            <a:off x="0" y="8685213"/>
+            <a:ext cx="2971800" cy="458787"/>
+          </a:xfrm>
+          <a:prstGeom prst="rect">
+            <a:avLst/>
+          </a:prstGeom>
+        </p:spPr>
+        <p:txBody>
+          <a:bodyPr vert="horz" lIns="91440" tIns="45720" rIns="91440" bIns="45720" rtlCol="0" anchor="b"/>
+          <a:lstStyle>
+            <a:lvl1pPr algn="l">
+              <a:defRPr sz="1200"/>
+            </a:lvl1pPr>
+          </a:lstStyle>
+          <a:p>
+            <a:endParaRPr lang="en-DK"/>
+          </a:p>
+        </p:txBody>
+      </p:sp>
+      <p:sp>
+        <p:nvSpPr>
+          <p:cNvPr id="7" name="Slide Number Placeholder 6"/>
+          <p:cNvSpPr>
+            <a:spLocks noGrp="1"/>
+          </p:cNvSpPr>
+          <p:nvPr>
+            <p:ph type="sldNum" sz="quarter" idx="5"/>
+          </p:nvPr>
+        </p:nvSpPr>
+        <p:spPr>
+          <a:xfrm>
+            <a:off x="3884613" y="8685213"/>
+            <a:ext cx="2971800" cy="458787"/>
+          </a:xfrm>
+          <a:prstGeom prst="rect">
+            <a:avLst/>
+          </a:prstGeom>
+        </p:spPr>
+        <p:txBody>
+          <a:bodyPr vert="horz" lIns="91440" tIns="45720" rIns="91440" bIns="45720" rtlCol="0" anchor="b"/>
+          <a:lstStyle>
+            <a:lvl1pPr algn="r">
+              <a:defRPr sz="1200"/>
+            </a:lvl1pPr>
+          </a:lstStyle>
+          <a:p>
+            <a:fld id="{32D2CB96-0617-49B3-9346-25524F6700A2}" type="slidenum">
+              <a:rPr lang="en-DK" smtClean="0"/>
+              <a:t>‹#›</a:t>
+            </a:fld>
+            <a:endParaRPr lang="en-DK"/>
+          </a:p>
+        </p:txBody>
+      </p:sp>
+    </p:spTree>
+    <p:extLst>
+      <p:ext uri="{BB962C8B-B14F-4D97-AF65-F5344CB8AC3E}">
+        <p14:creationId xmlns:p14="http://schemas.microsoft.com/office/powerpoint/2010/main" val="3176711771"/>
+      </p:ext>
+    </p:extLst>
+  </p:cSld>
+  <p:clrMap bg1="lt1" tx1="dk1" bg2="lt2" tx2="dk2" accent1="accent1" accent2="accent2" accent3="accent3" accent4="accent4" accent5="accent5" accent6="accent6" hlink="hlink" folHlink="folHlink"/>
+  <p:notesStyle>
+    <a:lvl1pPr marL="0" algn="l" defTabSz="914400" rtl="0" eaLnBrk="1" latinLnBrk="0" hangingPunct="1">
+      <a:defRPr sz="1200" kern="1200">
+        <a:solidFill>
+          <a:schemeClr val="tx1"/>
+        </a:solidFill>
+        <a:latin typeface="+mn-lt"/>
+        <a:ea typeface="+mn-ea"/>
+        <a:cs typeface="+mn-cs"/>
+      </a:defRPr>
+    </a:lvl1pPr>
+    <a:lvl2pPr marL="457200" algn="l" defTabSz="914400" rtl="0" eaLnBrk="1" latinLnBrk="0" hangingPunct="1">
+      <a:defRPr sz="1200" kern="1200">
+        <a:solidFill>
+          <a:schemeClr val="tx1"/>
+        </a:solidFill>
+        <a:latin typeface="+mn-lt"/>
+        <a:ea typeface="+mn-ea"/>
+        <a:cs typeface="+mn-cs"/>
+      </a:defRPr>
+    </a:lvl2pPr>
+    <a:lvl3pPr marL="914400" algn="l" defTabSz="914400" rtl="0" eaLnBrk="1" latinLnBrk="0" hangingPunct="1">
+      <a:defRPr sz="1200" kern="1200">
+        <a:solidFill>
+          <a:schemeClr val="tx1"/>
+        </a:solidFill>
+        <a:latin typeface="+mn-lt"/>
+        <a:ea typeface="+mn-ea"/>
+        <a:cs typeface="+mn-cs"/>
+      </a:defRPr>
+    </a:lvl3pPr>
+    <a:lvl4pPr marL="1371600" algn="l" defTabSz="914400" rtl="0" eaLnBrk="1" latinLnBrk="0" hangingPunct="1">
+      <a:defRPr sz="1200" kern="1200">
+        <a:solidFill>
+          <a:schemeClr val="tx1"/>
+        </a:solidFill>
+        <a:latin typeface="+mn-lt"/>
+        <a:ea typeface="+mn-ea"/>
+        <a:cs typeface="+mn-cs"/>
+      </a:defRPr>
+    </a:lvl4pPr>
+    <a:lvl5pPr marL="1828800" algn="l" defTabSz="914400" rtl="0" eaLnBrk="1" latinLnBrk="0" hangingPunct="1">
+      <a:defRPr sz="1200" kern="1200">
+        <a:solidFill>
+          <a:schemeClr val="tx1"/>
+        </a:solidFill>
+        <a:latin typeface="+mn-lt"/>
+        <a:ea typeface="+mn-ea"/>
+        <a:cs typeface="+mn-cs"/>
+      </a:defRPr>
+    </a:lvl5pPr>
+    <a:lvl6pPr marL="2286000" algn="l" defTabSz="914400" rtl="0" eaLnBrk="1" latinLnBrk="0" hangingPunct="1">
+      <a:defRPr sz="1200" kern="1200">
+        <a:solidFill>
+          <a:schemeClr val="tx1"/>
+        </a:solidFill>
+        <a:latin typeface="+mn-lt"/>
+        <a:ea typeface="+mn-ea"/>
+        <a:cs typeface="+mn-cs"/>
+      </a:defRPr>
+    </a:lvl6pPr>
+    <a:lvl7pPr marL="2743200" algn="l" defTabSz="914400" rtl="0" eaLnBrk="1" latinLnBrk="0" hangingPunct="1">
+      <a:defRPr sz="1200" kern="1200">
+        <a:solidFill>
+          <a:schemeClr val="tx1"/>
+        </a:solidFill>
+        <a:latin typeface="+mn-lt"/>
+        <a:ea typeface="+mn-ea"/>
+        <a:cs typeface="+mn-cs"/>
+      </a:defRPr>
+    </a:lvl7pPr>
+    <a:lvl8pPr marL="3200400" algn="l" defTabSz="914400" rtl="0" eaLnBrk="1" latinLnBrk="0" hangingPunct="1">
+      <a:defRPr sz="1200" kern="1200">
+        <a:solidFill>
+          <a:schemeClr val="tx1"/>
+        </a:solidFill>
+        <a:latin typeface="+mn-lt"/>
+        <a:ea typeface="+mn-ea"/>
+        <a:cs typeface="+mn-cs"/>
+      </a:defRPr>
+    </a:lvl8pPr>
+    <a:lvl9pPr marL="3657600" algn="l" defTabSz="914400" rtl="0" eaLnBrk="1" latinLnBrk="0" hangingPunct="1">
+      <a:defRPr sz="1200" kern="1200">
+        <a:solidFill>
+          <a:schemeClr val="tx1"/>
+        </a:solidFill>
+        <a:latin typeface="+mn-lt"/>
+        <a:ea typeface="+mn-ea"/>
+        <a:cs typeface="+mn-cs"/>
+      </a:defRPr>
+    </a:lvl9pPr>
+  </p:notesStyle>
+</p:notesMaster>
+</file>
+
+<file path=ppt/notesSlides/notesSlide1.xml><?xml version="1.0" encoding="utf-8"?>
+<p:notes xmlns:a="http://schemas.openxmlformats.org/drawingml/2006/main" xmlns:r="http://schemas.openxmlformats.org/officeDocument/2006/relationships" xmlns:p="http://schemas.openxmlformats.org/presentationml/2006/main">
+  <p:cSld>
+    <p:spTree>
+      <p:nvGrpSpPr>
+        <p:cNvPr id="1" name=""/>
+        <p:cNvGrpSpPr/>
+        <p:nvPr/>
+      </p:nvGrpSpPr>
+      <p:grpSpPr>
+        <a:xfrm>
+          <a:off x="0" y="0"/>
+          <a:ext cx="0" cy="0"/>
+          <a:chOff x="0" y="0"/>
+          <a:chExt cx="0" cy="0"/>
+        </a:xfrm>
+      </p:grpSpPr>
+      <p:sp>
+        <p:nvSpPr>
+          <p:cNvPr id="2" name="Slide Image Placeholder 1"/>
+          <p:cNvSpPr>
+            <a:spLocks noGrp="1" noRot="1" noChangeAspect="1"/>
+          </p:cNvSpPr>
+          <p:nvPr>
+            <p:ph type="sldImg"/>
+          </p:nvPr>
+        </p:nvSpPr>
+        <p:spPr/>
+      </p:sp>
+      <p:sp>
+        <p:nvSpPr>
+          <p:cNvPr id="3" name="Notes Placeholder 2"/>
+          <p:cNvSpPr>
+            <a:spLocks noGrp="1"/>
+          </p:cNvSpPr>
+          <p:nvPr>
+            <p:ph type="body" idx="1"/>
+          </p:nvPr>
+        </p:nvSpPr>
+        <p:spPr/>
+        <p:txBody>
+          <a:bodyPr/>
+          <a:lstStyle/>
+          <a:p>
+            <a:r>
+              <a:rPr lang="en-GB" dirty="0"/>
+              <a:t>Joystick</a:t>
+            </a:r>
+            <a:endParaRPr lang="en-DK" dirty="0"/>
+          </a:p>
+        </p:txBody>
+      </p:sp>
+      <p:sp>
+        <p:nvSpPr>
+          <p:cNvPr id="4" name="Slide Number Placeholder 3"/>
+          <p:cNvSpPr>
+            <a:spLocks noGrp="1"/>
+          </p:cNvSpPr>
+          <p:nvPr>
+            <p:ph type="sldNum" sz="quarter" idx="5"/>
+          </p:nvPr>
+        </p:nvSpPr>
+        <p:spPr/>
+        <p:txBody>
+          <a:bodyPr/>
+          <a:lstStyle/>
+          <a:p>
+            <a:fld id="{32D2CB96-0617-49B3-9346-25524F6700A2}" type="slidenum">
+              <a:rPr lang="en-DK" smtClean="0"/>
+              <a:t>1</a:t>
+            </a:fld>
+            <a:endParaRPr lang="en-DK"/>
+          </a:p>
+        </p:txBody>
+      </p:sp>
+    </p:spTree>
+    <p:extLst>
+      <p:ext uri="{BB962C8B-B14F-4D97-AF65-F5344CB8AC3E}">
+        <p14:creationId xmlns:p14="http://schemas.microsoft.com/office/powerpoint/2010/main" val="3314703124"/>
+      </p:ext>
+    </p:extLst>
+  </p:cSld>
+  <p:clrMapOvr>
+    <a:masterClrMapping/>
+  </p:clrMapOvr>
+</p:notes>
+</file>
+
+<file path=ppt/notesSlides/notesSlide2.xml><?xml version="1.0" encoding="utf-8"?>
+<p:notes xmlns:a="http://schemas.openxmlformats.org/drawingml/2006/main" xmlns:r="http://schemas.openxmlformats.org/officeDocument/2006/relationships" xmlns:p="http://schemas.openxmlformats.org/presentationml/2006/main">
+  <p:cSld>
+    <p:spTree>
+      <p:nvGrpSpPr>
+        <p:cNvPr id="1" name=""/>
+        <p:cNvGrpSpPr/>
+        <p:nvPr/>
+      </p:nvGrpSpPr>
+      <p:grpSpPr>
+        <a:xfrm>
+          <a:off x="0" y="0"/>
+          <a:ext cx="0" cy="0"/>
+          <a:chOff x="0" y="0"/>
+          <a:chExt cx="0" cy="0"/>
+        </a:xfrm>
+      </p:grpSpPr>
+      <p:sp>
+        <p:nvSpPr>
+          <p:cNvPr id="2" name="Slide Image Placeholder 1"/>
+          <p:cNvSpPr>
+            <a:spLocks noGrp="1" noRot="1" noChangeAspect="1"/>
+          </p:cNvSpPr>
+          <p:nvPr>
+            <p:ph type="sldImg"/>
+          </p:nvPr>
+        </p:nvSpPr>
+        <p:spPr/>
+      </p:sp>
+      <p:sp>
+        <p:nvSpPr>
+          <p:cNvPr id="3" name="Notes Placeholder 2"/>
+          <p:cNvSpPr>
+            <a:spLocks noGrp="1"/>
+          </p:cNvSpPr>
+          <p:nvPr>
+            <p:ph type="body" idx="1"/>
+          </p:nvPr>
+        </p:nvSpPr>
+        <p:spPr/>
+        <p:txBody>
+          <a:bodyPr/>
+          <a:lstStyle/>
+          <a:p>
+            <a:r>
+              <a:rPr lang="en-GB"/>
+              <a:t>LIO</a:t>
+            </a:r>
+            <a:endParaRPr lang="en-DK" dirty="0"/>
+          </a:p>
+        </p:txBody>
+      </p:sp>
+      <p:sp>
+        <p:nvSpPr>
+          <p:cNvPr id="4" name="Slide Number Placeholder 3"/>
+          <p:cNvSpPr>
+            <a:spLocks noGrp="1"/>
+          </p:cNvSpPr>
+          <p:nvPr>
+            <p:ph type="sldNum" sz="quarter" idx="5"/>
+          </p:nvPr>
+        </p:nvSpPr>
+        <p:spPr/>
+        <p:txBody>
+          <a:bodyPr/>
+          <a:lstStyle/>
+          <a:p>
+            <a:fld id="{32D2CB96-0617-49B3-9346-25524F6700A2}" type="slidenum">
+              <a:rPr lang="en-DK" smtClean="0"/>
+              <a:t>2</a:t>
+            </a:fld>
+            <a:endParaRPr lang="en-DK"/>
+          </a:p>
+        </p:txBody>
+      </p:sp>
+    </p:spTree>
+    <p:extLst>
+      <p:ext uri="{BB962C8B-B14F-4D97-AF65-F5344CB8AC3E}">
+        <p14:creationId xmlns:p14="http://schemas.microsoft.com/office/powerpoint/2010/main" val="3801482788"/>
+      </p:ext>
+    </p:extLst>
+  </p:cSld>
+  <p:clrMapOvr>
+    <a:masterClrMapping/>
+  </p:clrMapOvr>
+</p:notes>
 </file>
 
 <file path=ppt/slideLayouts/slideLayout1.xml><?xml version="1.0" encoding="utf-8"?>
@@ -562,128 +1092,6 @@
       </p:grpSpPr>
       <p:sp>
         <p:nvSpPr>
-          <p:cNvPr id="4" name="Oval 3">
-            <a:extLst>
-              <a:ext uri="{FF2B5EF4-FFF2-40B4-BE49-F238E27FC236}">
-                <a16:creationId xmlns:a16="http://schemas.microsoft.com/office/drawing/2014/main" id="{68D72EAD-5A81-DEF9-CF33-3BB873E34A8E}"/>
-              </a:ext>
-            </a:extLst>
-          </p:cNvPr>
-          <p:cNvSpPr/>
-          <p:nvPr/>
-        </p:nvSpPr>
-        <p:spPr>
-          <a:xfrm>
-            <a:off x="6675249" y="3000079"/>
-            <a:ext cx="895547" cy="857839"/>
-          </a:xfrm>
-          <a:prstGeom prst="ellipse">
-            <a:avLst/>
-          </a:prstGeom>
-          <a:solidFill>
-            <a:schemeClr val="tx1"/>
-          </a:solidFill>
-        </p:spPr>
-        <p:style>
-          <a:lnRef idx="2">
-            <a:schemeClr val="accent1">
-              <a:shade val="15000"/>
-            </a:schemeClr>
-          </a:lnRef>
-          <a:fillRef idx="1">
-            <a:schemeClr val="accent1"/>
-          </a:fillRef>
-          <a:effectRef idx="0">
-            <a:schemeClr val="accent1"/>
-          </a:effectRef>
-          <a:fontRef idx="minor">
-            <a:schemeClr val="lt1"/>
-          </a:fontRef>
-        </p:style>
-        <p:txBody>
-          <a:bodyPr rtlCol="0" anchor="ctr"/>
-          <a:lstStyle/>
-          <a:p>
-            <a:pPr algn="ctr"/>
-            <a:r>
-              <a:rPr lang="en-GB" sz="3200" dirty="0">
-                <a:solidFill>
-                  <a:schemeClr val="bg1"/>
-                </a:solidFill>
-              </a:rPr>
-              <a:t>2</a:t>
-            </a:r>
-            <a:endParaRPr lang="en-DK" dirty="0">
-              <a:solidFill>
-                <a:schemeClr val="bg1"/>
-              </a:solidFill>
-            </a:endParaRPr>
-          </a:p>
-        </p:txBody>
-      </p:sp>
-      <p:sp>
-        <p:nvSpPr>
-          <p:cNvPr id="6" name="Oval 5">
-            <a:extLst>
-              <a:ext uri="{FF2B5EF4-FFF2-40B4-BE49-F238E27FC236}">
-                <a16:creationId xmlns:a16="http://schemas.microsoft.com/office/drawing/2014/main" id="{5BB06849-C76D-0FB7-09DC-B8687A73F972}"/>
-              </a:ext>
-            </a:extLst>
-          </p:cNvPr>
-          <p:cNvSpPr/>
-          <p:nvPr/>
-        </p:nvSpPr>
-        <p:spPr>
-          <a:xfrm>
-            <a:off x="4825185" y="3000079"/>
-            <a:ext cx="895547" cy="857839"/>
-          </a:xfrm>
-          <a:prstGeom prst="ellipse">
-            <a:avLst/>
-          </a:prstGeom>
-          <a:solidFill>
-            <a:schemeClr val="tx1"/>
-          </a:solidFill>
-        </p:spPr>
-        <p:style>
-          <a:lnRef idx="2">
-            <a:schemeClr val="accent1">
-              <a:shade val="15000"/>
-            </a:schemeClr>
-          </a:lnRef>
-          <a:fillRef idx="1">
-            <a:schemeClr val="accent1"/>
-          </a:fillRef>
-          <a:effectRef idx="0">
-            <a:schemeClr val="accent1"/>
-          </a:effectRef>
-          <a:fontRef idx="minor">
-            <a:schemeClr val="lt1"/>
-          </a:fontRef>
-        </p:style>
-        <p:txBody>
-          <a:bodyPr rtlCol="0" anchor="ctr"/>
-          <a:lstStyle/>
-          <a:p>
-            <a:pPr algn="ctr"/>
-            <a:r>
-              <a:rPr lang="en-GB" sz="3200" dirty="0">
-                <a:solidFill>
-                  <a:schemeClr val="bg1"/>
-                </a:solidFill>
-              </a:rPr>
-              <a:t>4</a:t>
-            </a:r>
-            <a:endParaRPr lang="en-DK" dirty="0">
-              <a:solidFill>
-                <a:schemeClr val="bg1"/>
-              </a:solidFill>
-            </a:endParaRPr>
-          </a:p>
-        </p:txBody>
-      </p:sp>
-      <p:sp>
-        <p:nvSpPr>
           <p:cNvPr id="7" name="TextBox 6">
             <a:extLst>
               <a:ext uri="{FF2B5EF4-FFF2-40B4-BE49-F238E27FC236}">
@@ -721,10 +1129,10 @@
       </p:sp>
       <p:sp>
         <p:nvSpPr>
-          <p:cNvPr id="3" name="TextBox 2">
+          <p:cNvPr id="2" name="TextBox 1">
             <a:extLst>
               <a:ext uri="{FF2B5EF4-FFF2-40B4-BE49-F238E27FC236}">
-                <a16:creationId xmlns:a16="http://schemas.microsoft.com/office/drawing/2014/main" id="{745629B4-1EE2-BDD2-C5DD-9B1CA42F5B19}"/>
+                <a16:creationId xmlns:a16="http://schemas.microsoft.com/office/drawing/2014/main" id="{1A0A1212-C7E6-C5FC-AD3A-72B4148F87F0}"/>
               </a:ext>
             </a:extLst>
           </p:cNvPr>
@@ -733,7 +1141,7 @@
         </p:nvSpPr>
         <p:spPr>
           <a:xfrm>
-            <a:off x="7984503" y="3136610"/>
+            <a:off x="7984503" y="2715986"/>
             <a:ext cx="1470274" cy="584775"/>
           </a:xfrm>
           <a:prstGeom prst="rect">
@@ -757,10 +1165,10 @@
       </p:sp>
       <p:sp>
         <p:nvSpPr>
-          <p:cNvPr id="8" name="TextBox 7">
+          <p:cNvPr id="5" name="TextBox 4">
             <a:extLst>
               <a:ext uri="{FF2B5EF4-FFF2-40B4-BE49-F238E27FC236}">
-                <a16:creationId xmlns:a16="http://schemas.microsoft.com/office/drawing/2014/main" id="{C9B69DAA-FCFC-5E40-01EF-D4FCE348077D}"/>
+                <a16:creationId xmlns:a16="http://schemas.microsoft.com/office/drawing/2014/main" id="{6090D6BB-1C2B-F9B5-D415-445C4A4022D5}"/>
               </a:ext>
             </a:extLst>
           </p:cNvPr>
@@ -769,7 +1177,7 @@
         </p:nvSpPr>
         <p:spPr>
           <a:xfrm>
-            <a:off x="2941204" y="3136610"/>
+            <a:off x="2941204" y="2715986"/>
             <a:ext cx="1409360" cy="584775"/>
           </a:xfrm>
           <a:prstGeom prst="rect">
@@ -791,10 +1199,400 @@
           </a:p>
         </p:txBody>
       </p:sp>
+      <p:pic>
+        <p:nvPicPr>
+          <p:cNvPr id="12" name="Picture 11" descr="A close up of a controller&#10;&#10;AI-generated content may be incorrect.">
+            <a:extLst>
+              <a:ext uri="{FF2B5EF4-FFF2-40B4-BE49-F238E27FC236}">
+                <a16:creationId xmlns:a16="http://schemas.microsoft.com/office/drawing/2014/main" id="{8681B0C0-0B41-7169-AF73-FEB668195076}"/>
+              </a:ext>
+            </a:extLst>
+          </p:cNvPr>
+          <p:cNvPicPr>
+            <a:picLocks noChangeAspect="1"/>
+          </p:cNvPicPr>
+          <p:nvPr/>
+        </p:nvPicPr>
+        <p:blipFill>
+          <a:blip r:embed="rId3">
+            <a:extLst>
+              <a:ext uri="{28A0092B-C50C-407E-A947-70E740481C1C}">
+                <a14:useLocalDpi xmlns:a14="http://schemas.microsoft.com/office/drawing/2010/main" val="0"/>
+              </a:ext>
+            </a:extLst>
+          </a:blip>
+          <a:stretch>
+            <a:fillRect/>
+          </a:stretch>
+        </p:blipFill>
+        <p:spPr>
+          <a:xfrm>
+            <a:off x="3942688" y="3918657"/>
+            <a:ext cx="4306624" cy="2500431"/>
+          </a:xfrm>
+          <a:prstGeom prst="rect">
+            <a:avLst/>
+          </a:prstGeom>
+        </p:spPr>
+      </p:pic>
+      <p:cxnSp>
+        <p:nvCxnSpPr>
+          <p:cNvPr id="14" name="Connector: Elbow 13">
+            <a:extLst>
+              <a:ext uri="{FF2B5EF4-FFF2-40B4-BE49-F238E27FC236}">
+                <a16:creationId xmlns:a16="http://schemas.microsoft.com/office/drawing/2014/main" id="{53236DD1-7602-4580-BC4D-1BFFCCE666C8}"/>
+              </a:ext>
+            </a:extLst>
+          </p:cNvPr>
+          <p:cNvCxnSpPr>
+            <a:stCxn id="5" idx="3"/>
+          </p:cNvCxnSpPr>
+          <p:nvPr/>
+        </p:nvCxnSpPr>
+        <p:spPr>
+          <a:xfrm>
+            <a:off x="4350564" y="3008374"/>
+            <a:ext cx="578052" cy="910283"/>
+          </a:xfrm>
+          <a:prstGeom prst="bentConnector2">
+            <a:avLst/>
+          </a:prstGeom>
+          <a:ln w="76200">
+            <a:solidFill>
+              <a:schemeClr val="tx1"/>
+            </a:solidFill>
+            <a:tailEnd type="triangle"/>
+          </a:ln>
+        </p:spPr>
+        <p:style>
+          <a:lnRef idx="1">
+            <a:schemeClr val="accent1"/>
+          </a:lnRef>
+          <a:fillRef idx="0">
+            <a:schemeClr val="accent1"/>
+          </a:fillRef>
+          <a:effectRef idx="0">
+            <a:schemeClr val="accent1"/>
+          </a:effectRef>
+          <a:fontRef idx="minor">
+            <a:schemeClr val="tx1"/>
+          </a:fontRef>
+        </p:style>
+      </p:cxnSp>
+      <p:cxnSp>
+        <p:nvCxnSpPr>
+          <p:cNvPr id="15" name="Connector: Elbow 14">
+            <a:extLst>
+              <a:ext uri="{FF2B5EF4-FFF2-40B4-BE49-F238E27FC236}">
+                <a16:creationId xmlns:a16="http://schemas.microsoft.com/office/drawing/2014/main" id="{E6DEA8B4-3E1C-D308-467C-A73570F870F4}"/>
+              </a:ext>
+            </a:extLst>
+          </p:cNvPr>
+          <p:cNvCxnSpPr>
+            <a:cxnSpLocks/>
+            <a:stCxn id="2" idx="1"/>
+          </p:cNvCxnSpPr>
+          <p:nvPr/>
+        </p:nvCxnSpPr>
+        <p:spPr>
+          <a:xfrm rot="10800000" flipV="1">
+            <a:off x="7263387" y="3008373"/>
+            <a:ext cx="721117" cy="910281"/>
+          </a:xfrm>
+          <a:prstGeom prst="bentConnector2">
+            <a:avLst/>
+          </a:prstGeom>
+          <a:ln w="76200">
+            <a:solidFill>
+              <a:schemeClr val="tx1"/>
+            </a:solidFill>
+            <a:tailEnd type="triangle"/>
+          </a:ln>
+        </p:spPr>
+        <p:style>
+          <a:lnRef idx="1">
+            <a:schemeClr val="accent1"/>
+          </a:lnRef>
+          <a:fillRef idx="0">
+            <a:schemeClr val="accent1"/>
+          </a:fillRef>
+          <a:effectRef idx="0">
+            <a:schemeClr val="accent1"/>
+          </a:effectRef>
+          <a:fontRef idx="minor">
+            <a:schemeClr val="tx1"/>
+          </a:fontRef>
+        </p:style>
+      </p:cxnSp>
     </p:spTree>
     <p:extLst>
       <p:ext uri="{BB962C8B-B14F-4D97-AF65-F5344CB8AC3E}">
         <p14:creationId xmlns:p14="http://schemas.microsoft.com/office/powerpoint/2010/main" val="3886354962"/>
+      </p:ext>
+    </p:extLst>
+  </p:cSld>
+  <p:clrMapOvr>
+    <a:masterClrMapping/>
+  </p:clrMapOvr>
+</p:sld>
+</file>
+
+<file path=ppt/slides/slide2.xml><?xml version="1.0" encoding="utf-8"?>
+<p:sld xmlns:a="http://schemas.openxmlformats.org/drawingml/2006/main" xmlns:r="http://schemas.openxmlformats.org/officeDocument/2006/relationships" xmlns:p="http://schemas.openxmlformats.org/presentationml/2006/main">
+  <p:cSld>
+    <p:spTree>
+      <p:nvGrpSpPr>
+        <p:cNvPr id="1" name=""/>
+        <p:cNvGrpSpPr/>
+        <p:nvPr/>
+      </p:nvGrpSpPr>
+      <p:grpSpPr>
+        <a:xfrm>
+          <a:off x="0" y="0"/>
+          <a:ext cx="0" cy="0"/>
+          <a:chOff x="0" y="0"/>
+          <a:chExt cx="0" cy="0"/>
+        </a:xfrm>
+      </p:grpSpPr>
+      <p:pic>
+        <p:nvPicPr>
+          <p:cNvPr id="3" name="Picture 2" descr="A white rectangular object with blue buttons&#10;&#10;Description automatically generated">
+            <a:extLst>
+              <a:ext uri="{FF2B5EF4-FFF2-40B4-BE49-F238E27FC236}">
+                <a16:creationId xmlns:a16="http://schemas.microsoft.com/office/drawing/2014/main" id="{613F8AEE-63AC-12E3-58A0-0B661F494ECE}"/>
+              </a:ext>
+            </a:extLst>
+          </p:cNvPr>
+          <p:cNvPicPr>
+            <a:picLocks noChangeAspect="1"/>
+          </p:cNvPicPr>
+          <p:nvPr/>
+        </p:nvPicPr>
+        <p:blipFill>
+          <a:blip r:embed="rId3">
+            <a:extLst>
+              <a:ext uri="{28A0092B-C50C-407E-A947-70E740481C1C}">
+                <a14:useLocalDpi xmlns:a14="http://schemas.microsoft.com/office/drawing/2010/main" val="0"/>
+              </a:ext>
+            </a:extLst>
+          </a:blip>
+          <a:stretch>
+            <a:fillRect/>
+          </a:stretch>
+        </p:blipFill>
+        <p:spPr>
+          <a:xfrm>
+            <a:off x="4288671" y="3732848"/>
+            <a:ext cx="3695832" cy="2956665"/>
+          </a:xfrm>
+          <a:prstGeom prst="rect">
+            <a:avLst/>
+          </a:prstGeom>
+        </p:spPr>
+      </p:pic>
+      <p:sp>
+        <p:nvSpPr>
+          <p:cNvPr id="8" name="TextBox 7">
+            <a:extLst>
+              <a:ext uri="{FF2B5EF4-FFF2-40B4-BE49-F238E27FC236}">
+                <a16:creationId xmlns:a16="http://schemas.microsoft.com/office/drawing/2014/main" id="{5B6CC123-E72E-7147-9B0D-E5EE44D2BBC1}"/>
+              </a:ext>
+            </a:extLst>
+          </p:cNvPr>
+          <p:cNvSpPr txBox="1"/>
+          <p:nvPr/>
+        </p:nvSpPr>
+        <p:spPr>
+          <a:xfrm>
+            <a:off x="1434905" y="997060"/>
+            <a:ext cx="9322189" cy="1200329"/>
+          </a:xfrm>
+          <a:prstGeom prst="rect">
+            <a:avLst/>
+          </a:prstGeom>
+          <a:noFill/>
+        </p:spPr>
+        <p:txBody>
+          <a:bodyPr wrap="square" rtlCol="0">
+            <a:spAutoFit/>
+          </a:bodyPr>
+          <a:lstStyle/>
+          <a:p>
+            <a:pPr algn="ctr"/>
+            <a:r>
+              <a:rPr lang="en-GB" sz="2400" dirty="0"/>
+              <a:t>You will see a series of seven letters. Such as SSSCSSS, HHHKHHH, SSSHSSS. If the middle letter is a S or a C press button 4, and if the middle letter is a H or K press button 2.</a:t>
+            </a:r>
+            <a:endParaRPr lang="en-DK" sz="2400" dirty="0"/>
+          </a:p>
+        </p:txBody>
+      </p:sp>
+      <p:sp>
+        <p:nvSpPr>
+          <p:cNvPr id="11" name="TextBox 10">
+            <a:extLst>
+              <a:ext uri="{FF2B5EF4-FFF2-40B4-BE49-F238E27FC236}">
+                <a16:creationId xmlns:a16="http://schemas.microsoft.com/office/drawing/2014/main" id="{B875F60A-CA1D-17BF-C8DB-E5BBF14CA056}"/>
+              </a:ext>
+            </a:extLst>
+          </p:cNvPr>
+          <p:cNvSpPr txBox="1"/>
+          <p:nvPr/>
+        </p:nvSpPr>
+        <p:spPr>
+          <a:xfrm>
+            <a:off x="7984503" y="2715986"/>
+            <a:ext cx="1470274" cy="584775"/>
+          </a:xfrm>
+          <a:prstGeom prst="rect">
+            <a:avLst/>
+          </a:prstGeom>
+          <a:noFill/>
+        </p:spPr>
+        <p:txBody>
+          <a:bodyPr wrap="none" rtlCol="0">
+            <a:spAutoFit/>
+          </a:bodyPr>
+          <a:lstStyle/>
+          <a:p>
+            <a:r>
+              <a:rPr lang="en-GB" sz="3200" dirty="0"/>
+              <a:t>H and K</a:t>
+            </a:r>
+            <a:endParaRPr lang="en-DK" sz="3200" dirty="0"/>
+          </a:p>
+        </p:txBody>
+      </p:sp>
+      <p:sp>
+        <p:nvSpPr>
+          <p:cNvPr id="12" name="TextBox 11">
+            <a:extLst>
+              <a:ext uri="{FF2B5EF4-FFF2-40B4-BE49-F238E27FC236}">
+                <a16:creationId xmlns:a16="http://schemas.microsoft.com/office/drawing/2014/main" id="{C4B8F3F9-7E34-4237-F821-1A49F89AD7AD}"/>
+              </a:ext>
+            </a:extLst>
+          </p:cNvPr>
+          <p:cNvSpPr txBox="1"/>
+          <p:nvPr/>
+        </p:nvSpPr>
+        <p:spPr>
+          <a:xfrm>
+            <a:off x="2941204" y="2715986"/>
+            <a:ext cx="1409360" cy="584775"/>
+          </a:xfrm>
+          <a:prstGeom prst="rect">
+            <a:avLst/>
+          </a:prstGeom>
+          <a:noFill/>
+        </p:spPr>
+        <p:txBody>
+          <a:bodyPr wrap="none" rtlCol="0">
+            <a:spAutoFit/>
+          </a:bodyPr>
+          <a:lstStyle/>
+          <a:p>
+            <a:r>
+              <a:rPr lang="en-GB" sz="3200" dirty="0"/>
+              <a:t>S and C</a:t>
+            </a:r>
+            <a:endParaRPr lang="en-DK" sz="3200" dirty="0"/>
+          </a:p>
+        </p:txBody>
+      </p:sp>
+      <p:cxnSp>
+        <p:nvCxnSpPr>
+          <p:cNvPr id="13" name="Connector: Elbow 12">
+            <a:extLst>
+              <a:ext uri="{FF2B5EF4-FFF2-40B4-BE49-F238E27FC236}">
+                <a16:creationId xmlns:a16="http://schemas.microsoft.com/office/drawing/2014/main" id="{B91607C7-EABE-3DB3-EB7D-EF893266FF7E}"/>
+              </a:ext>
+            </a:extLst>
+          </p:cNvPr>
+          <p:cNvCxnSpPr>
+            <a:cxnSpLocks/>
+            <a:stCxn id="12" idx="3"/>
+          </p:cNvCxnSpPr>
+          <p:nvPr/>
+        </p:nvCxnSpPr>
+        <p:spPr>
+          <a:xfrm>
+            <a:off x="4350564" y="3008374"/>
+            <a:ext cx="504900" cy="910280"/>
+          </a:xfrm>
+          <a:prstGeom prst="bentConnector2">
+            <a:avLst/>
+          </a:prstGeom>
+          <a:ln w="76200">
+            <a:solidFill>
+              <a:schemeClr val="tx1"/>
+            </a:solidFill>
+            <a:tailEnd type="triangle"/>
+          </a:ln>
+        </p:spPr>
+        <p:style>
+          <a:lnRef idx="1">
+            <a:schemeClr val="accent1"/>
+          </a:lnRef>
+          <a:fillRef idx="0">
+            <a:schemeClr val="accent1"/>
+          </a:fillRef>
+          <a:effectRef idx="0">
+            <a:schemeClr val="accent1"/>
+          </a:effectRef>
+          <a:fontRef idx="minor">
+            <a:schemeClr val="tx1"/>
+          </a:fontRef>
+        </p:style>
+      </p:cxnSp>
+      <p:cxnSp>
+        <p:nvCxnSpPr>
+          <p:cNvPr id="14" name="Connector: Elbow 13">
+            <a:extLst>
+              <a:ext uri="{FF2B5EF4-FFF2-40B4-BE49-F238E27FC236}">
+                <a16:creationId xmlns:a16="http://schemas.microsoft.com/office/drawing/2014/main" id="{96A7CF24-DE61-4C32-D878-FFF59BA0C9E8}"/>
+              </a:ext>
+            </a:extLst>
+          </p:cNvPr>
+          <p:cNvCxnSpPr>
+            <a:cxnSpLocks/>
+            <a:stCxn id="11" idx="1"/>
+          </p:cNvCxnSpPr>
+          <p:nvPr/>
+        </p:nvCxnSpPr>
+        <p:spPr>
+          <a:xfrm rot="10800000" flipV="1">
+            <a:off x="7205473" y="3008373"/>
+            <a:ext cx="779031" cy="910279"/>
+          </a:xfrm>
+          <a:prstGeom prst="bentConnector2">
+            <a:avLst/>
+          </a:prstGeom>
+          <a:ln w="76200">
+            <a:solidFill>
+              <a:schemeClr val="tx1"/>
+            </a:solidFill>
+            <a:tailEnd type="triangle"/>
+          </a:ln>
+        </p:spPr>
+        <p:style>
+          <a:lnRef idx="1">
+            <a:schemeClr val="accent1"/>
+          </a:lnRef>
+          <a:fillRef idx="0">
+            <a:schemeClr val="accent1"/>
+          </a:fillRef>
+          <a:effectRef idx="0">
+            <a:schemeClr val="accent1"/>
+          </a:effectRef>
+          <a:fontRef idx="minor">
+            <a:schemeClr val="tx1"/>
+          </a:fontRef>
+        </p:style>
+      </p:cxnSp>
+    </p:spTree>
+    <p:extLst>
+      <p:ext uri="{BB962C8B-B14F-4D97-AF65-F5344CB8AC3E}">
+        <p14:creationId xmlns:p14="http://schemas.microsoft.com/office/powerpoint/2010/main" val="2585725414"/>
       </p:ext>
     </p:extLst>
   </p:cSld>
@@ -1097,4 +1895,319 @@
     </a:ext>
   </a:extLst>
 </a:theme>
+</file>
+
+<file path=ppt/theme/theme2.xml><?xml version="1.0" encoding="utf-8"?>
+<a:theme xmlns:a="http://schemas.openxmlformats.org/drawingml/2006/main" name="Office Theme">
+  <a:themeElements>
+    <a:clrScheme name="Office">
+      <a:dk1>
+        <a:sysClr val="windowText" lastClr="000000"/>
+      </a:dk1>
+      <a:lt1>
+        <a:sysClr val="window" lastClr="FFFFFF"/>
+      </a:lt1>
+      <a:dk2>
+        <a:srgbClr val="0E2841"/>
+      </a:dk2>
+      <a:lt2>
+        <a:srgbClr val="E8E8E8"/>
+      </a:lt2>
+      <a:accent1>
+        <a:srgbClr val="156082"/>
+      </a:accent1>
+      <a:accent2>
+        <a:srgbClr val="E97132"/>
+      </a:accent2>
+      <a:accent3>
+        <a:srgbClr val="196B24"/>
+      </a:accent3>
+      <a:accent4>
+        <a:srgbClr val="0F9ED5"/>
+      </a:accent4>
+      <a:accent5>
+        <a:srgbClr val="A02B93"/>
+      </a:accent5>
+      <a:accent6>
+        <a:srgbClr val="4EA72E"/>
+      </a:accent6>
+      <a:hlink>
+        <a:srgbClr val="467886"/>
+      </a:hlink>
+      <a:folHlink>
+        <a:srgbClr val="96607D"/>
+      </a:folHlink>
+    </a:clrScheme>
+    <a:fontScheme name="Office">
+      <a:majorFont>
+        <a:latin typeface="Aptos Display" panose="02110004020202020204"/>
+        <a:ea typeface=""/>
+        <a:cs typeface=""/>
+        <a:font script="Jpan" typeface="游ゴシック Light"/>
+        <a:font script="Hang" typeface="맑은 고딕"/>
+        <a:font script="Hans" typeface="等线 Light"/>
+        <a:font script="Hant" typeface="新細明體"/>
+        <a:font script="Arab" typeface="Times New Roman"/>
+        <a:font script="Hebr" typeface="Times New Roman"/>
+        <a:font script="Thai" typeface="Angsana New"/>
+        <a:font script="Ethi" typeface="Nyala"/>
+        <a:font script="Beng" typeface="Vrinda"/>
+        <a:font script="Gujr" typeface="Shruti"/>
+        <a:font script="Khmr" typeface="MoolBoran"/>
+        <a:font script="Knda" typeface="Tunga"/>
+        <a:font script="Guru" typeface="Raavi"/>
+        <a:font script="Cans" typeface="Euphemia"/>
+        <a:font script="Cher" typeface="Plantagenet Cherokee"/>
+        <a:font script="Yiii" typeface="Microsoft Yi Baiti"/>
+        <a:font script="Tibt" typeface="Microsoft Himalaya"/>
+        <a:font script="Thaa" typeface="MV Boli"/>
+        <a:font script="Deva" typeface="Mangal"/>
+        <a:font script="Telu" typeface="Gautami"/>
+        <a:font script="Taml" typeface="Latha"/>
+        <a:font script="Syrc" typeface="Estrangelo Edessa"/>
+        <a:font script="Orya" typeface="Kalinga"/>
+        <a:font script="Mlym" typeface="Kartika"/>
+        <a:font script="Laoo" typeface="DokChampa"/>
+        <a:font script="Sinh" typeface="Iskoola Pota"/>
+        <a:font script="Mong" typeface="Mongolian Baiti"/>
+        <a:font script="Viet" typeface="Times New Roman"/>
+        <a:font script="Uigh" typeface="Microsoft Uighur"/>
+        <a:font script="Geor" typeface="Sylfaen"/>
+        <a:font script="Armn" typeface="Arial"/>
+        <a:font script="Bugi" typeface="Leelawadee UI"/>
+        <a:font script="Bopo" typeface="Microsoft JhengHei"/>
+        <a:font script="Java" typeface="Javanese Text"/>
+        <a:font script="Lisu" typeface="Segoe UI"/>
+        <a:font script="Mymr" typeface="Myanmar Text"/>
+        <a:font script="Nkoo" typeface="Ebrima"/>
+        <a:font script="Olck" typeface="Nirmala UI"/>
+        <a:font script="Osma" typeface="Ebrima"/>
+        <a:font script="Phag" typeface="Phagspa"/>
+        <a:font script="Syrn" typeface="Estrangelo Edessa"/>
+        <a:font script="Syrj" typeface="Estrangelo Edessa"/>
+        <a:font script="Syre" typeface="Estrangelo Edessa"/>
+        <a:font script="Sora" typeface="Nirmala UI"/>
+        <a:font script="Tale" typeface="Microsoft Tai Le"/>
+        <a:font script="Talu" typeface="Microsoft New Tai Lue"/>
+        <a:font script="Tfng" typeface="Ebrima"/>
+      </a:majorFont>
+      <a:minorFont>
+        <a:latin typeface="Aptos" panose="02110004020202020204"/>
+        <a:ea typeface=""/>
+        <a:cs typeface=""/>
+        <a:font script="Jpan" typeface="游ゴシック"/>
+        <a:font script="Hang" typeface="맑은 고딕"/>
+        <a:font script="Hans" typeface="等线"/>
+        <a:font script="Hant" typeface="新細明體"/>
+        <a:font script="Arab" typeface="Arial"/>
+        <a:font script="Hebr" typeface="Arial"/>
+        <a:font script="Thai" typeface="Cordia New"/>
+        <a:font script="Ethi" typeface="Nyala"/>
+        <a:font script="Beng" typeface="Vrinda"/>
+        <a:font script="Gujr" typeface="Shruti"/>
+        <a:font script="Khmr" typeface="DaunPenh"/>
+        <a:font script="Knda" typeface="Tunga"/>
+        <a:font script="Guru" typeface="Raavi"/>
+        <a:font script="Cans" typeface="Euphemia"/>
+        <a:font script="Cher" typeface="Plantagenet Cherokee"/>
+        <a:font script="Yiii" typeface="Microsoft Yi Baiti"/>
+        <a:font script="Tibt" typeface="Microsoft Himalaya"/>
+        <a:font script="Thaa" typeface="MV Boli"/>
+        <a:font script="Deva" typeface="Mangal"/>
+        <a:font script="Telu" typeface="Gautami"/>
+        <a:font script="Taml" typeface="Latha"/>
+        <a:font script="Syrc" typeface="Estrangelo Edessa"/>
+        <a:font script="Orya" typeface="Kalinga"/>
+        <a:font script="Mlym" typeface="Kartika"/>
+        <a:font script="Laoo" typeface="DokChampa"/>
+        <a:font script="Sinh" typeface="Iskoola Pota"/>
+        <a:font script="Mong" typeface="Mongolian Baiti"/>
+        <a:font script="Viet" typeface="Arial"/>
+        <a:font script="Uigh" typeface="Microsoft Uighur"/>
+        <a:font script="Geor" typeface="Sylfaen"/>
+        <a:font script="Armn" typeface="Arial"/>
+        <a:font script="Bugi" typeface="Leelawadee UI"/>
+        <a:font script="Bopo" typeface="Microsoft JhengHei"/>
+        <a:font script="Java" typeface="Javanese Text"/>
+        <a:font script="Lisu" typeface="Segoe UI"/>
+        <a:font script="Mymr" typeface="Myanmar Text"/>
+        <a:font script="Nkoo" typeface="Ebrima"/>
+        <a:font script="Olck" typeface="Nirmala UI"/>
+        <a:font script="Osma" typeface="Ebrima"/>
+        <a:font script="Phag" typeface="Phagspa"/>
+        <a:font script="Syrn" typeface="Estrangelo Edessa"/>
+        <a:font script="Syrj" typeface="Estrangelo Edessa"/>
+        <a:font script="Syre" typeface="Estrangelo Edessa"/>
+        <a:font script="Sora" typeface="Nirmala UI"/>
+        <a:font script="Tale" typeface="Microsoft Tai Le"/>
+        <a:font script="Talu" typeface="Microsoft New Tai Lue"/>
+        <a:font script="Tfng" typeface="Ebrima"/>
+      </a:minorFont>
+    </a:fontScheme>
+    <a:fmtScheme name="Office">
+      <a:fillStyleLst>
+        <a:solidFill>
+          <a:schemeClr val="phClr"/>
+        </a:solidFill>
+        <a:gradFill rotWithShape="1">
+          <a:gsLst>
+            <a:gs pos="0">
+              <a:schemeClr val="phClr">
+                <a:lumMod val="110000"/>
+                <a:satMod val="105000"/>
+                <a:tint val="67000"/>
+              </a:schemeClr>
+            </a:gs>
+            <a:gs pos="50000">
+              <a:schemeClr val="phClr">
+                <a:lumMod val="105000"/>
+                <a:satMod val="103000"/>
+                <a:tint val="73000"/>
+              </a:schemeClr>
+            </a:gs>
+            <a:gs pos="100000">
+              <a:schemeClr val="phClr">
+                <a:lumMod val="105000"/>
+                <a:satMod val="109000"/>
+                <a:tint val="81000"/>
+              </a:schemeClr>
+            </a:gs>
+          </a:gsLst>
+          <a:lin ang="5400000" scaled="0"/>
+        </a:gradFill>
+        <a:gradFill rotWithShape="1">
+          <a:gsLst>
+            <a:gs pos="0">
+              <a:schemeClr val="phClr">
+                <a:satMod val="103000"/>
+                <a:lumMod val="102000"/>
+                <a:tint val="94000"/>
+              </a:schemeClr>
+            </a:gs>
+            <a:gs pos="50000">
+              <a:schemeClr val="phClr">
+                <a:satMod val="110000"/>
+                <a:lumMod val="100000"/>
+                <a:shade val="100000"/>
+              </a:schemeClr>
+            </a:gs>
+            <a:gs pos="100000">
+              <a:schemeClr val="phClr">
+                <a:lumMod val="99000"/>
+                <a:satMod val="120000"/>
+                <a:shade val="78000"/>
+              </a:schemeClr>
+            </a:gs>
+          </a:gsLst>
+          <a:lin ang="5400000" scaled="0"/>
+        </a:gradFill>
+      </a:fillStyleLst>
+      <a:lnStyleLst>
+        <a:ln w="12700" cap="flat" cmpd="sng" algn="ctr">
+          <a:solidFill>
+            <a:schemeClr val="phClr"/>
+          </a:solidFill>
+          <a:prstDash val="solid"/>
+          <a:miter lim="800000"/>
+        </a:ln>
+        <a:ln w="19050" cap="flat" cmpd="sng" algn="ctr">
+          <a:solidFill>
+            <a:schemeClr val="phClr"/>
+          </a:solidFill>
+          <a:prstDash val="solid"/>
+          <a:miter lim="800000"/>
+        </a:ln>
+        <a:ln w="25400" cap="flat" cmpd="sng" algn="ctr">
+          <a:solidFill>
+            <a:schemeClr val="phClr"/>
+          </a:solidFill>
+          <a:prstDash val="solid"/>
+          <a:miter lim="800000"/>
+        </a:ln>
+      </a:lnStyleLst>
+      <a:effectStyleLst>
+        <a:effectStyle>
+          <a:effectLst/>
+        </a:effectStyle>
+        <a:effectStyle>
+          <a:effectLst/>
+        </a:effectStyle>
+        <a:effectStyle>
+          <a:effectLst>
+            <a:outerShdw blurRad="57150" dist="19050" dir="5400000" algn="ctr" rotWithShape="0">
+              <a:srgbClr val="000000">
+                <a:alpha val="63000"/>
+              </a:srgbClr>
+            </a:outerShdw>
+          </a:effectLst>
+        </a:effectStyle>
+      </a:effectStyleLst>
+      <a:bgFillStyleLst>
+        <a:solidFill>
+          <a:schemeClr val="phClr"/>
+        </a:solidFill>
+        <a:solidFill>
+          <a:schemeClr val="phClr">
+            <a:tint val="95000"/>
+            <a:satMod val="170000"/>
+          </a:schemeClr>
+        </a:solidFill>
+        <a:gradFill rotWithShape="1">
+          <a:gsLst>
+            <a:gs pos="0">
+              <a:schemeClr val="phClr">
+                <a:tint val="93000"/>
+                <a:satMod val="150000"/>
+                <a:shade val="98000"/>
+                <a:lumMod val="102000"/>
+              </a:schemeClr>
+            </a:gs>
+            <a:gs pos="50000">
+              <a:schemeClr val="phClr">
+                <a:tint val="98000"/>
+                <a:satMod val="130000"/>
+                <a:shade val="90000"/>
+                <a:lumMod val="103000"/>
+              </a:schemeClr>
+            </a:gs>
+            <a:gs pos="100000">
+              <a:schemeClr val="phClr">
+                <a:shade val="63000"/>
+                <a:satMod val="120000"/>
+              </a:schemeClr>
+            </a:gs>
+          </a:gsLst>
+          <a:lin ang="5400000" scaled="0"/>
+        </a:gradFill>
+      </a:bgFillStyleLst>
+    </a:fmtScheme>
+  </a:themeElements>
+  <a:objectDefaults>
+    <a:lnDef>
+      <a:spPr/>
+      <a:bodyPr/>
+      <a:lstStyle/>
+      <a:style>
+        <a:lnRef idx="2">
+          <a:schemeClr val="accent1"/>
+        </a:lnRef>
+        <a:fillRef idx="0">
+          <a:schemeClr val="accent1"/>
+        </a:fillRef>
+        <a:effectRef idx="1">
+          <a:schemeClr val="accent1"/>
+        </a:effectRef>
+        <a:fontRef idx="minor">
+          <a:schemeClr val="tx1"/>
+        </a:fontRef>
+      </a:style>
+    </a:lnDef>
+  </a:objectDefaults>
+  <a:extraClrSchemeLst/>
+  <a:extLst>
+    <a:ext uri="{05A4C25C-085E-4340-85A3-A5531E510DB2}">
+      <thm15:themeFamily xmlns:thm15="http://schemas.microsoft.com/office/thememl/2012/main" name="Office Theme" id="{2E142A2C-CD16-42D6-873A-C26D2A0506FA}" vid="{1BDDFF52-6CD6-40A5-AB3C-68EB2F1E4D0A}"/>
+    </a:ext>
+  </a:extLst>
+</a:theme>
 </file>
</xml_diff>

<commit_message>
Updated instructions and fixed button mapping
</commit_message>
<xml_diff>
--- a/cogni.flanker.task/FlankerInstruction.pptx
+++ b/cogni.flanker.task/FlankerInstruction.pptx
@@ -599,7 +599,7 @@
           <a:lstStyle/>
           <a:p>
             <a:r>
-              <a:rPr lang="en-GB"/>
+              <a:rPr lang="en-GB" dirty="0"/>
               <a:t>LIO</a:t>
             </a:r>
             <a:endParaRPr lang="en-DK" dirty="0"/>
@@ -1092,43 +1092,6 @@
       </p:grpSpPr>
       <p:sp>
         <p:nvSpPr>
-          <p:cNvPr id="7" name="TextBox 6">
-            <a:extLst>
-              <a:ext uri="{FF2B5EF4-FFF2-40B4-BE49-F238E27FC236}">
-                <a16:creationId xmlns:a16="http://schemas.microsoft.com/office/drawing/2014/main" id="{72272CE1-E739-FDA7-3DE8-0908A2ED6630}"/>
-              </a:ext>
-            </a:extLst>
-          </p:cNvPr>
-          <p:cNvSpPr txBox="1"/>
-          <p:nvPr/>
-        </p:nvSpPr>
-        <p:spPr>
-          <a:xfrm>
-            <a:off x="1434905" y="997060"/>
-            <a:ext cx="9322189" cy="1200329"/>
-          </a:xfrm>
-          <a:prstGeom prst="rect">
-            <a:avLst/>
-          </a:prstGeom>
-          <a:noFill/>
-        </p:spPr>
-        <p:txBody>
-          <a:bodyPr wrap="square" rtlCol="0">
-            <a:spAutoFit/>
-          </a:bodyPr>
-          <a:lstStyle/>
-          <a:p>
-            <a:pPr algn="ctr"/>
-            <a:r>
-              <a:rPr lang="en-GB" sz="2400" dirty="0"/>
-              <a:t>You will see a series of seven letters. Such as SSSCSSS, HHHKHHH, SSSHSSS. If the middle letter is a S or a C press button 4, and if the middle letter is a H or K press button 2.</a:t>
-            </a:r>
-            <a:endParaRPr lang="en-DK" sz="2400" dirty="0"/>
-          </a:p>
-        </p:txBody>
-      </p:sp>
-      <p:sp>
-        <p:nvSpPr>
           <p:cNvPr id="2" name="TextBox 1">
             <a:extLst>
               <a:ext uri="{FF2B5EF4-FFF2-40B4-BE49-F238E27FC236}">
@@ -1142,7 +1105,7 @@
         <p:spPr>
           <a:xfrm>
             <a:off x="7984503" y="2715986"/>
-            <a:ext cx="1470274" cy="584775"/>
+            <a:ext cx="1409360" cy="584775"/>
           </a:xfrm>
           <a:prstGeom prst="rect">
             <a:avLst/>
@@ -1157,7 +1120,7 @@
           <a:p>
             <a:r>
               <a:rPr lang="en-GB" sz="3200" dirty="0"/>
-              <a:t>H and K</a:t>
+              <a:t>S and C</a:t>
             </a:r>
             <a:endParaRPr lang="en-DK" sz="3200" dirty="0"/>
           </a:p>
@@ -1178,7 +1141,7 @@
         <p:spPr>
           <a:xfrm>
             <a:off x="2941204" y="2715986"/>
-            <a:ext cx="1409360" cy="584775"/>
+            <a:ext cx="1470274" cy="584775"/>
           </a:xfrm>
           <a:prstGeom prst="rect">
             <a:avLst/>
@@ -1193,7 +1156,7 @@
           <a:p>
             <a:r>
               <a:rPr lang="en-GB" sz="3200" dirty="0"/>
-              <a:t>S and C</a:t>
+              <a:t>H and K</a:t>
             </a:r>
             <a:endParaRPr lang="en-DK" sz="3200" dirty="0"/>
           </a:p>
@@ -1251,8 +1214,8 @@
         </p:nvCxnSpPr>
         <p:spPr>
           <a:xfrm>
-            <a:off x="4350564" y="3008374"/>
-            <a:ext cx="578052" cy="910283"/>
+            <a:off x="4411478" y="3008374"/>
+            <a:ext cx="517138" cy="910283"/>
           </a:xfrm>
           <a:prstGeom prst="bentConnector2">
             <a:avLst/>
@@ -1296,8 +1259,8 @@
         </p:nvCxnSpPr>
         <p:spPr>
           <a:xfrm rot="10800000" flipV="1">
-            <a:off x="7263387" y="3008373"/>
-            <a:ext cx="721117" cy="910281"/>
+            <a:off x="7263395" y="3008373"/>
+            <a:ext cx="721109" cy="910273"/>
           </a:xfrm>
           <a:prstGeom prst="bentConnector2">
             <a:avLst/>
@@ -1324,6 +1287,43 @@
           </a:fontRef>
         </p:style>
       </p:cxnSp>
+      <p:sp>
+        <p:nvSpPr>
+          <p:cNvPr id="3" name="TextBox 2">
+            <a:extLst>
+              <a:ext uri="{FF2B5EF4-FFF2-40B4-BE49-F238E27FC236}">
+                <a16:creationId xmlns:a16="http://schemas.microsoft.com/office/drawing/2014/main" id="{F6669884-4E1E-1E07-A9AF-1F0002471CB2}"/>
+              </a:ext>
+            </a:extLst>
+          </p:cNvPr>
+          <p:cNvSpPr txBox="1"/>
+          <p:nvPr/>
+        </p:nvSpPr>
+        <p:spPr>
+          <a:xfrm>
+            <a:off x="1434905" y="997060"/>
+            <a:ext cx="9322189" cy="1200329"/>
+          </a:xfrm>
+          <a:prstGeom prst="rect">
+            <a:avLst/>
+          </a:prstGeom>
+          <a:noFill/>
+        </p:spPr>
+        <p:txBody>
+          <a:bodyPr wrap="square" rtlCol="0">
+            <a:spAutoFit/>
+          </a:bodyPr>
+          <a:lstStyle/>
+          <a:p>
+            <a:pPr algn="ctr"/>
+            <a:r>
+              <a:rPr lang="en-GB" sz="2400" dirty="0"/>
+              <a:t>You will see a series of seven letters. Such as SSSCSSS, HHHKHHH, SSSHSSS. If the middle letter is a S or a C press right, and if the middle letter is a H or K press left.</a:t>
+            </a:r>
+            <a:endParaRPr lang="en-DK" sz="2400" dirty="0"/>
+          </a:p>
+        </p:txBody>
+      </p:sp>
     </p:spTree>
     <p:extLst>
       <p:ext uri="{BB962C8B-B14F-4D97-AF65-F5344CB8AC3E}">
@@ -1421,7 +1421,7 @@
             <a:pPr algn="ctr"/>
             <a:r>
               <a:rPr lang="en-GB" sz="2400" dirty="0"/>
-              <a:t>You will see a series of seven letters. Such as SSSCSSS, HHHKHHH, SSSHSSS. If the middle letter is a S or a C press button 4, and if the middle letter is a H or K press button 2.</a:t>
+              <a:t>You will see a series of seven letters. Such as SSSCSSS, HHHKHHH, SSSHSSS. If the middle letter is a S or a C press right, and if the middle letter is a H or K press left.</a:t>
             </a:r>
             <a:endParaRPr lang="en-DK" sz="2400" dirty="0"/>
           </a:p>
@@ -1442,7 +1442,7 @@
         <p:spPr>
           <a:xfrm>
             <a:off x="7984503" y="2715986"/>
-            <a:ext cx="1470274" cy="584775"/>
+            <a:ext cx="1409360" cy="584775"/>
           </a:xfrm>
           <a:prstGeom prst="rect">
             <a:avLst/>
@@ -1457,7 +1457,7 @@
           <a:p>
             <a:r>
               <a:rPr lang="en-GB" sz="3200" dirty="0"/>
-              <a:t>H and K</a:t>
+              <a:t>S and C</a:t>
             </a:r>
             <a:endParaRPr lang="en-DK" sz="3200" dirty="0"/>
           </a:p>
@@ -1478,7 +1478,7 @@
         <p:spPr>
           <a:xfrm>
             <a:off x="2941204" y="2715986"/>
-            <a:ext cx="1409360" cy="584775"/>
+            <a:ext cx="1470274" cy="584775"/>
           </a:xfrm>
           <a:prstGeom prst="rect">
             <a:avLst/>
@@ -1493,7 +1493,7 @@
           <a:p>
             <a:r>
               <a:rPr lang="en-GB" sz="3200" dirty="0"/>
-              <a:t>S and C</a:t>
+              <a:t>H and K</a:t>
             </a:r>
             <a:endParaRPr lang="en-DK" sz="3200" dirty="0"/>
           </a:p>
@@ -1516,8 +1516,8 @@
         </p:nvCxnSpPr>
         <p:spPr>
           <a:xfrm>
-            <a:off x="4350564" y="3008374"/>
-            <a:ext cx="504900" cy="910280"/>
+            <a:off x="4411478" y="3008374"/>
+            <a:ext cx="443986" cy="910280"/>
           </a:xfrm>
           <a:prstGeom prst="bentConnector2">
             <a:avLst/>
@@ -1561,8 +1561,8 @@
         </p:nvCxnSpPr>
         <p:spPr>
           <a:xfrm rot="10800000" flipV="1">
-            <a:off x="7205473" y="3008373"/>
-            <a:ext cx="779031" cy="910279"/>
+            <a:off x="7205481" y="3008373"/>
+            <a:ext cx="779023" cy="910271"/>
           </a:xfrm>
           <a:prstGeom prst="bentConnector2">
             <a:avLst/>

</xml_diff>